<commit_message>
präzis Personen mit Matrikelnummern eingefügt (Konrad fehlt)
</commit_message>
<xml_diff>
--- a/Doku/Dokumentation/Präsentation/Präsentation1.pptx
+++ b/Doku/Dokumentation/Präsentation/Präsentation1.pptx
@@ -202,7 +202,7 @@
           <a:p>
             <a:fld id="{3C5C1F87-A553-D54A-8D92-982D0D8B1973}" type="datetime1">
               <a:rPr lang="de-DE" smtClean="0"/>
-              <a:t>27.07.15</a:t>
+              <a:t>29.07.15</a:t>
             </a:fld>
             <a:endParaRPr lang="de-DE"/>
           </a:p>
@@ -268,7 +268,7 @@
           <a:p>
             <a:fld id="{431B8F80-19F3-4945-B239-7477821F02B5}" type="slidenum">
               <a:rPr lang="de-DE" smtClean="0"/>
-              <a:t>‹#›</a:t>
+              <a:t>‹Nr.›</a:t>
             </a:fld>
             <a:endParaRPr lang="de-DE"/>
           </a:p>
@@ -368,7 +368,7 @@
           <a:p>
             <a:fld id="{5EBEB032-4C8F-D14A-8C9D-7EF290BC175F}" type="datetime1">
               <a:rPr lang="de-DE" smtClean="0"/>
-              <a:t>27.07.15</a:t>
+              <a:t>29.07.15</a:t>
             </a:fld>
             <a:endParaRPr lang="de-DE"/>
           </a:p>
@@ -527,7 +527,7 @@
           <a:p>
             <a:fld id="{3C8D0F26-E54A-6B4C-9639-65B577CA5DAC}" type="slidenum">
               <a:rPr lang="de-DE" smtClean="0"/>
-              <a:t>‹#›</a:t>
+              <a:t>‹Nr.›</a:t>
             </a:fld>
             <a:endParaRPr lang="de-DE"/>
           </a:p>
@@ -1406,7 +1406,7 @@
           <a:p>
             <a:fld id="{1C409EFA-92D1-2F45-84E5-8C09624895D8}" type="datetime1">
               <a:rPr lang="de-DE" smtClean="0"/>
-              <a:t>27.07.15</a:t>
+              <a:t>29.07.15</a:t>
             </a:fld>
             <a:endParaRPr lang="de-DE"/>
           </a:p>
@@ -1448,7 +1448,7 @@
           <a:p>
             <a:fld id="{CD958BD3-45DB-3A44-9016-E9DE6C097A8B}" type="slidenum">
               <a:rPr lang="de-DE" smtClean="0"/>
-              <a:t>‹#›</a:t>
+              <a:t>‹Nr.›</a:t>
             </a:fld>
             <a:endParaRPr lang="de-DE"/>
           </a:p>
@@ -1576,7 +1576,7 @@
           <a:p>
             <a:fld id="{CC9C6B11-0577-8246-A3BA-B300B0F499A5}" type="datetime1">
               <a:rPr lang="de-DE" smtClean="0"/>
-              <a:t>27.07.15</a:t>
+              <a:t>29.07.15</a:t>
             </a:fld>
             <a:endParaRPr lang="de-DE"/>
           </a:p>
@@ -1618,7 +1618,7 @@
           <a:p>
             <a:fld id="{CD958BD3-45DB-3A44-9016-E9DE6C097A8B}" type="slidenum">
               <a:rPr lang="de-DE" smtClean="0"/>
-              <a:t>‹#›</a:t>
+              <a:t>‹Nr.›</a:t>
             </a:fld>
             <a:endParaRPr lang="de-DE"/>
           </a:p>
@@ -1756,7 +1756,7 @@
           <a:p>
             <a:fld id="{6902ABF9-E8A2-8E4D-B50D-9137CB1F6782}" type="datetime1">
               <a:rPr lang="de-DE" smtClean="0"/>
-              <a:t>27.07.15</a:t>
+              <a:t>29.07.15</a:t>
             </a:fld>
             <a:endParaRPr lang="de-DE"/>
           </a:p>
@@ -1798,7 +1798,7 @@
           <a:p>
             <a:fld id="{CD958BD3-45DB-3A44-9016-E9DE6C097A8B}" type="slidenum">
               <a:rPr lang="de-DE" smtClean="0"/>
-              <a:t>‹#›</a:t>
+              <a:t>‹Nr.›</a:t>
             </a:fld>
             <a:endParaRPr lang="de-DE"/>
           </a:p>
@@ -1926,7 +1926,7 @@
           <a:p>
             <a:fld id="{A2C708EA-969E-8C41-86B2-F6AEDE275753}" type="datetime1">
               <a:rPr lang="de-DE" smtClean="0"/>
-              <a:t>27.07.15</a:t>
+              <a:t>29.07.15</a:t>
             </a:fld>
             <a:endParaRPr lang="de-DE"/>
           </a:p>
@@ -1968,7 +1968,7 @@
           <a:p>
             <a:fld id="{CD958BD3-45DB-3A44-9016-E9DE6C097A8B}" type="slidenum">
               <a:rPr lang="de-DE" smtClean="0"/>
-              <a:t>‹#›</a:t>
+              <a:t>‹Nr.›</a:t>
             </a:fld>
             <a:endParaRPr lang="de-DE"/>
           </a:p>
@@ -2172,7 +2172,7 @@
           <a:p>
             <a:fld id="{AEAE3140-3677-294F-BB1A-0172ED5847FC}" type="datetime1">
               <a:rPr lang="de-DE" smtClean="0"/>
-              <a:t>27.07.15</a:t>
+              <a:t>29.07.15</a:t>
             </a:fld>
             <a:endParaRPr lang="de-DE"/>
           </a:p>
@@ -2214,7 +2214,7 @@
           <a:p>
             <a:fld id="{CD958BD3-45DB-3A44-9016-E9DE6C097A8B}" type="slidenum">
               <a:rPr lang="de-DE" smtClean="0"/>
-              <a:t>‹#›</a:t>
+              <a:t>‹Nr.›</a:t>
             </a:fld>
             <a:endParaRPr lang="de-DE"/>
           </a:p>
@@ -2460,7 +2460,7 @@
           <a:p>
             <a:fld id="{1ACAACC3-F3C9-824E-B495-1FDE64EF99BD}" type="datetime1">
               <a:rPr lang="de-DE" smtClean="0"/>
-              <a:t>27.07.15</a:t>
+              <a:t>29.07.15</a:t>
             </a:fld>
             <a:endParaRPr lang="de-DE"/>
           </a:p>
@@ -2502,7 +2502,7 @@
           <a:p>
             <a:fld id="{CD958BD3-45DB-3A44-9016-E9DE6C097A8B}" type="slidenum">
               <a:rPr lang="de-DE" smtClean="0"/>
-              <a:t>‹#›</a:t>
+              <a:t>‹Nr.›</a:t>
             </a:fld>
             <a:endParaRPr lang="de-DE"/>
           </a:p>
@@ -2882,7 +2882,7 @@
           <a:p>
             <a:fld id="{71DB1126-796D-D447-B9E8-151D005B0148}" type="datetime1">
               <a:rPr lang="de-DE" smtClean="0"/>
-              <a:t>27.07.15</a:t>
+              <a:t>29.07.15</a:t>
             </a:fld>
             <a:endParaRPr lang="de-DE"/>
           </a:p>
@@ -2924,7 +2924,7 @@
           <a:p>
             <a:fld id="{CD958BD3-45DB-3A44-9016-E9DE6C097A8B}" type="slidenum">
               <a:rPr lang="de-DE" smtClean="0"/>
-              <a:t>‹#›</a:t>
+              <a:t>‹Nr.›</a:t>
             </a:fld>
             <a:endParaRPr lang="de-DE"/>
           </a:p>
@@ -3000,7 +3000,7 @@
           <a:p>
             <a:fld id="{4CF1641E-36A7-7A48-BECA-119086F567EF}" type="datetime1">
               <a:rPr lang="de-DE" smtClean="0"/>
-              <a:t>27.07.15</a:t>
+              <a:t>29.07.15</a:t>
             </a:fld>
             <a:endParaRPr lang="de-DE"/>
           </a:p>
@@ -3042,7 +3042,7 @@
           <a:p>
             <a:fld id="{CD958BD3-45DB-3A44-9016-E9DE6C097A8B}" type="slidenum">
               <a:rPr lang="de-DE" smtClean="0"/>
-              <a:t>‹#›</a:t>
+              <a:t>‹Nr.›</a:t>
             </a:fld>
             <a:endParaRPr lang="de-DE"/>
           </a:p>
@@ -3095,7 +3095,7 @@
           <a:p>
             <a:fld id="{35F65FC4-9A5E-7749-B2FE-88A153ECB593}" type="datetime1">
               <a:rPr lang="de-DE" smtClean="0"/>
-              <a:t>27.07.15</a:t>
+              <a:t>29.07.15</a:t>
             </a:fld>
             <a:endParaRPr lang="de-DE"/>
           </a:p>
@@ -3137,7 +3137,7 @@
           <a:p>
             <a:fld id="{CD958BD3-45DB-3A44-9016-E9DE6C097A8B}" type="slidenum">
               <a:rPr lang="de-DE" smtClean="0"/>
-              <a:t>‹#›</a:t>
+              <a:t>‹Nr.›</a:t>
             </a:fld>
             <a:endParaRPr lang="de-DE"/>
           </a:p>
@@ -3372,7 +3372,7 @@
           <a:p>
             <a:fld id="{B03973DD-0E77-DA46-B1C6-B169DCECB667}" type="datetime1">
               <a:rPr lang="de-DE" smtClean="0"/>
-              <a:t>27.07.15</a:t>
+              <a:t>29.07.15</a:t>
             </a:fld>
             <a:endParaRPr lang="de-DE"/>
           </a:p>
@@ -3414,7 +3414,7 @@
           <a:p>
             <a:fld id="{CD958BD3-45DB-3A44-9016-E9DE6C097A8B}" type="slidenum">
               <a:rPr lang="de-DE" smtClean="0"/>
-              <a:t>‹#›</a:t>
+              <a:t>‹Nr.›</a:t>
             </a:fld>
             <a:endParaRPr lang="de-DE"/>
           </a:p>
@@ -3625,7 +3625,7 @@
           <a:p>
             <a:fld id="{FDA4983A-5DE4-D64A-9ECF-D3D9C6C15267}" type="datetime1">
               <a:rPr lang="de-DE" smtClean="0"/>
-              <a:t>27.07.15</a:t>
+              <a:t>29.07.15</a:t>
             </a:fld>
             <a:endParaRPr lang="de-DE"/>
           </a:p>
@@ -3667,7 +3667,7 @@
           <a:p>
             <a:fld id="{CD958BD3-45DB-3A44-9016-E9DE6C097A8B}" type="slidenum">
               <a:rPr lang="de-DE" smtClean="0"/>
-              <a:t>‹#›</a:t>
+              <a:t>‹Nr.›</a:t>
             </a:fld>
             <a:endParaRPr lang="de-DE"/>
           </a:p>
@@ -3838,7 +3838,7 @@
           <a:p>
             <a:fld id="{999BCF29-3F8F-2D4D-85F8-AC23766BD627}" type="datetime1">
               <a:rPr lang="de-DE" smtClean="0"/>
-              <a:t>27.07.15</a:t>
+              <a:t>29.07.15</a:t>
             </a:fld>
             <a:endParaRPr lang="de-DE"/>
           </a:p>
@@ -3916,7 +3916,7 @@
           <a:p>
             <a:fld id="{CD958BD3-45DB-3A44-9016-E9DE6C097A8B}" type="slidenum">
               <a:rPr lang="de-DE" smtClean="0"/>
-              <a:t>‹#›</a:t>
+              <a:t>‹Nr.›</a:t>
             </a:fld>
             <a:endParaRPr lang="de-DE"/>
           </a:p>
@@ -4231,107 +4231,6 @@
           <p:nvPr/>
         </p:nvPicPr>
         <p:blipFill>
-          <a:blip r:embed="rId2">
-            <a:extLst>
-              <a:ext uri="{28A0092B-C50C-407E-A947-70E740481C1C}">
-                <a14:useLocalDpi xmlns:a14="http://schemas.microsoft.com/office/drawing/2010/main" val="0"/>
-              </a:ext>
-            </a:extLst>
-          </a:blip>
-          <a:stretch>
-            <a:fillRect/>
-          </a:stretch>
-        </p:blipFill>
-        <p:spPr>
-          <a:xfrm>
-            <a:off x="6894671" y="0"/>
-            <a:ext cx="3771900" cy="1041400"/>
-          </a:xfrm>
-          <a:prstGeom prst="rect">
-            <a:avLst/>
-          </a:prstGeom>
-        </p:spPr>
-      </p:pic>
-      <p:sp>
-        <p:nvSpPr>
-          <p:cNvPr id="7" name="Rechteck 6"/>
-          <p:cNvSpPr/>
-          <p:nvPr/>
-        </p:nvSpPr>
-        <p:spPr>
-          <a:xfrm>
-            <a:off x="2590800" y="4480450"/>
-            <a:ext cx="3868274" cy="1754327"/>
-          </a:xfrm>
-          <a:prstGeom prst="rect">
-            <a:avLst/>
-          </a:prstGeom>
-        </p:spPr>
-        <p:txBody>
-          <a:bodyPr wrap="square">
-            <a:spAutoFit/>
-          </a:bodyPr>
-          <a:lstStyle/>
-          <a:p>
-            <a:r>
-              <a:rPr lang="it-IT" dirty="0" err="1" smtClean="0"/>
-              <a:t>Gruppe</a:t>
-            </a:r>
-            <a:r>
-              <a:rPr lang="it-IT" dirty="0" smtClean="0"/>
-              <a:t> 09:</a:t>
-            </a:r>
-          </a:p>
-          <a:p>
-            <a:r>
-              <a:rPr lang="it-IT" dirty="0" smtClean="0"/>
-              <a:t>Fabian </a:t>
-            </a:r>
-            <a:r>
-              <a:rPr lang="it-IT" dirty="0" err="1" smtClean="0"/>
-              <a:t>Redecker</a:t>
-            </a:r>
-            <a:r>
-              <a:rPr lang="it-IT" dirty="0" smtClean="0"/>
-              <a:t> (375750)</a:t>
-            </a:r>
-          </a:p>
-          <a:p>
-            <a:r>
-              <a:rPr lang="it-IT" dirty="0" smtClean="0"/>
-              <a:t>Marco</a:t>
-            </a:r>
-          </a:p>
-          <a:p>
-            <a:r>
-              <a:rPr lang="it-IT" dirty="0" smtClean="0"/>
-              <a:t>Oli</a:t>
-            </a:r>
-          </a:p>
-          <a:p>
-            <a:r>
-              <a:rPr lang="it-IT" dirty="0" smtClean="0"/>
-              <a:t>Mike</a:t>
-            </a:r>
-          </a:p>
-          <a:p>
-            <a:r>
-              <a:rPr lang="it-IT" dirty="0" smtClean="0"/>
-              <a:t>Konrad</a:t>
-            </a:r>
-            <a:endParaRPr lang="it-IT" dirty="0"/>
-          </a:p>
-        </p:txBody>
-      </p:sp>
-      <p:pic>
-        <p:nvPicPr>
-          <p:cNvPr id="9" name="Bild 8" descr="DatenbankLogo.png"/>
-          <p:cNvPicPr>
-            <a:picLocks noChangeAspect="1"/>
-          </p:cNvPicPr>
-          <p:nvPr/>
-        </p:nvPicPr>
-        <p:blipFill>
           <a:blip r:embed="rId3">
             <a:extLst>
               <a:ext uri="{28A0092B-C50C-407E-A947-70E740481C1C}">
@@ -4345,14 +4244,101 @@
         </p:blipFill>
         <p:spPr>
           <a:xfrm>
-            <a:off x="759967" y="1731264"/>
-            <a:ext cx="7443531" cy="2231136"/>
+            <a:off x="6894671" y="0"/>
+            <a:ext cx="3771900" cy="1041400"/>
           </a:xfrm>
           <a:prstGeom prst="rect">
             <a:avLst/>
           </a:prstGeom>
         </p:spPr>
       </p:pic>
+      <p:pic>
+        <p:nvPicPr>
+          <p:cNvPr id="9" name="Bild 8" descr="DatenbankLogo.png"/>
+          <p:cNvPicPr>
+            <a:picLocks noChangeAspect="1"/>
+          </p:cNvPicPr>
+          <p:nvPr/>
+        </p:nvPicPr>
+        <p:blipFill>
+          <a:blip r:embed="rId4">
+            <a:extLst>
+              <a:ext uri="{28A0092B-C50C-407E-A947-70E740481C1C}">
+                <a14:useLocalDpi xmlns:a14="http://schemas.microsoft.com/office/drawing/2010/main" val="0"/>
+              </a:ext>
+            </a:extLst>
+          </a:blip>
+          <a:stretch>
+            <a:fillRect/>
+          </a:stretch>
+        </p:blipFill>
+        <p:spPr>
+          <a:xfrm>
+            <a:off x="759967" y="1731264"/>
+            <a:ext cx="7443531" cy="2231136"/>
+          </a:xfrm>
+          <a:prstGeom prst="rect">
+            <a:avLst/>
+          </a:prstGeom>
+        </p:spPr>
+      </p:pic>
+      <p:graphicFrame>
+        <p:nvGraphicFramePr>
+          <p:cNvPr id="2" name="Objekt 1"/>
+          <p:cNvGraphicFramePr>
+            <a:graphicFrameLocks noChangeAspect="1"/>
+          </p:cNvGraphicFramePr>
+          <p:nvPr>
+            <p:extLst>
+              <p:ext uri="{D42A27DB-BD31-4B8C-83A1-F6EECF244321}">
+                <p14:modId xmlns:p14="http://schemas.microsoft.com/office/powerpoint/2010/main" val="3588683580"/>
+              </p:ext>
+            </p:extLst>
+          </p:nvPr>
+        </p:nvGraphicFramePr>
+        <p:xfrm>
+          <a:off x="1504950" y="4181475"/>
+          <a:ext cx="6134100" cy="2438400"/>
+        </p:xfrm>
+        <a:graphic>
+          <a:graphicData uri="http://schemas.openxmlformats.org/presentationml/2006/ole">
+            <mc:AlternateContent xmlns:mc="http://schemas.openxmlformats.org/markup-compatibility/2006">
+              <mc:Choice xmlns:v="urn:schemas-microsoft-com:vml" Requires="v">
+                <p:oleObj spid="_x0000_s1025" name="Dokument" r:id="rId5" imgW="6134100" imgH="2438400" progId="Word.Document.12">
+                  <p:embed/>
+                </p:oleObj>
+              </mc:Choice>
+              <mc:Fallback>
+                <p:oleObj name="Dokument" r:id="rId5" imgW="6134100" imgH="2438400" progId="Word.Document.12">
+                  <p:embed/>
+                  <p:pic>
+                    <p:nvPicPr>
+                      <p:cNvPr id="0" name=""/>
+                      <p:cNvPicPr/>
+                      <p:nvPr/>
+                    </p:nvPicPr>
+                    <p:blipFill>
+                      <a:blip r:embed="rId6"/>
+                      <a:stretch>
+                        <a:fillRect/>
+                      </a:stretch>
+                    </p:blipFill>
+                    <p:spPr>
+                      <a:xfrm>
+                        <a:off x="1504950" y="4181475"/>
+                        <a:ext cx="6134100" cy="2438400"/>
+                      </a:xfrm>
+                      <a:prstGeom prst="rect">
+                        <a:avLst/>
+                      </a:prstGeom>
+                    </p:spPr>
+                  </p:pic>
+                </p:oleObj>
+              </mc:Fallback>
+            </mc:AlternateContent>
+          </a:graphicData>
+        </a:graphic>
+      </p:graphicFrame>
     </p:spTree>
     <p:extLst>
       <p:ext uri="{BB962C8B-B14F-4D97-AF65-F5344CB8AC3E}">

</xml_diff>

<commit_message>
Präzis (ein Rechtschreibfehler behoben)
</commit_message>
<xml_diff>
--- a/Doku/Dokumentation/Präsentation/Präsentation1.pptx
+++ b/Doku/Dokumentation/Präsentation/Präsentation1.pptx
@@ -208,7 +208,7 @@
           <a:p>
             <a:fld id="{3C5C1F87-A553-D54A-8D92-982D0D8B1973}" type="datetime1">
               <a:rPr lang="de-DE" smtClean="0"/>
-              <a:t>02.08.15</a:t>
+              <a:t>03.08.15</a:t>
             </a:fld>
             <a:endParaRPr lang="de-DE"/>
           </a:p>
@@ -374,7 +374,7 @@
           <a:p>
             <a:fld id="{5EBEB032-4C8F-D14A-8C9D-7EF290BC175F}" type="datetime1">
               <a:rPr lang="de-DE" smtClean="0"/>
-              <a:t>02.08.15</a:t>
+              <a:t>03.08.15</a:t>
             </a:fld>
             <a:endParaRPr lang="de-DE"/>
           </a:p>
@@ -1916,7 +1916,7 @@
           <a:p>
             <a:fld id="{1C409EFA-92D1-2F45-84E5-8C09624895D8}" type="datetime1">
               <a:rPr lang="de-DE" smtClean="0"/>
-              <a:t>02.08.15</a:t>
+              <a:t>03.08.15</a:t>
             </a:fld>
             <a:endParaRPr lang="de-DE"/>
           </a:p>
@@ -2086,7 +2086,7 @@
           <a:p>
             <a:fld id="{CC9C6B11-0577-8246-A3BA-B300B0F499A5}" type="datetime1">
               <a:rPr lang="de-DE" smtClean="0"/>
-              <a:t>02.08.15</a:t>
+              <a:t>03.08.15</a:t>
             </a:fld>
             <a:endParaRPr lang="de-DE"/>
           </a:p>
@@ -2266,7 +2266,7 @@
           <a:p>
             <a:fld id="{6902ABF9-E8A2-8E4D-B50D-9137CB1F6782}" type="datetime1">
               <a:rPr lang="de-DE" smtClean="0"/>
-              <a:t>02.08.15</a:t>
+              <a:t>03.08.15</a:t>
             </a:fld>
             <a:endParaRPr lang="de-DE"/>
           </a:p>
@@ -2436,7 +2436,7 @@
           <a:p>
             <a:fld id="{A2C708EA-969E-8C41-86B2-F6AEDE275753}" type="datetime1">
               <a:rPr lang="de-DE" smtClean="0"/>
-              <a:t>02.08.15</a:t>
+              <a:t>03.08.15</a:t>
             </a:fld>
             <a:endParaRPr lang="de-DE"/>
           </a:p>
@@ -2682,7 +2682,7 @@
           <a:p>
             <a:fld id="{AEAE3140-3677-294F-BB1A-0172ED5847FC}" type="datetime1">
               <a:rPr lang="de-DE" smtClean="0"/>
-              <a:t>02.08.15</a:t>
+              <a:t>03.08.15</a:t>
             </a:fld>
             <a:endParaRPr lang="de-DE"/>
           </a:p>
@@ -2970,7 +2970,7 @@
           <a:p>
             <a:fld id="{1ACAACC3-F3C9-824E-B495-1FDE64EF99BD}" type="datetime1">
               <a:rPr lang="de-DE" smtClean="0"/>
-              <a:t>02.08.15</a:t>
+              <a:t>03.08.15</a:t>
             </a:fld>
             <a:endParaRPr lang="de-DE"/>
           </a:p>
@@ -3392,7 +3392,7 @@
           <a:p>
             <a:fld id="{71DB1126-796D-D447-B9E8-151D005B0148}" type="datetime1">
               <a:rPr lang="de-DE" smtClean="0"/>
-              <a:t>02.08.15</a:t>
+              <a:t>03.08.15</a:t>
             </a:fld>
             <a:endParaRPr lang="de-DE"/>
           </a:p>
@@ -3510,7 +3510,7 @@
           <a:p>
             <a:fld id="{4CF1641E-36A7-7A48-BECA-119086F567EF}" type="datetime1">
               <a:rPr lang="de-DE" smtClean="0"/>
-              <a:t>02.08.15</a:t>
+              <a:t>03.08.15</a:t>
             </a:fld>
             <a:endParaRPr lang="de-DE"/>
           </a:p>
@@ -3605,7 +3605,7 @@
           <a:p>
             <a:fld id="{35F65FC4-9A5E-7749-B2FE-88A153ECB593}" type="datetime1">
               <a:rPr lang="de-DE" smtClean="0"/>
-              <a:t>02.08.15</a:t>
+              <a:t>03.08.15</a:t>
             </a:fld>
             <a:endParaRPr lang="de-DE"/>
           </a:p>
@@ -3882,7 +3882,7 @@
           <a:p>
             <a:fld id="{B03973DD-0E77-DA46-B1C6-B169DCECB667}" type="datetime1">
               <a:rPr lang="de-DE" smtClean="0"/>
-              <a:t>02.08.15</a:t>
+              <a:t>03.08.15</a:t>
             </a:fld>
             <a:endParaRPr lang="de-DE"/>
           </a:p>
@@ -4135,7 +4135,7 @@
           <a:p>
             <a:fld id="{FDA4983A-5DE4-D64A-9ECF-D3D9C6C15267}" type="datetime1">
               <a:rPr lang="de-DE" smtClean="0"/>
-              <a:t>02.08.15</a:t>
+              <a:t>03.08.15</a:t>
             </a:fld>
             <a:endParaRPr lang="de-DE"/>
           </a:p>
@@ -4351,7 +4351,7 @@
           <a:p>
             <a:fld id="{999BCF29-3F8F-2D4D-85F8-AC23766BD627}" type="datetime1">
               <a:rPr lang="de-DE" smtClean="0"/>
-              <a:t>02.08.15</a:t>
+              <a:t>03.08.15</a:t>
             </a:fld>
             <a:endParaRPr lang="de-DE"/>
           </a:p>
@@ -4809,7 +4809,7 @@
           <a:graphicData uri="http://schemas.openxmlformats.org/presentationml/2006/ole">
             <mc:AlternateContent xmlns:mc="http://schemas.openxmlformats.org/markup-compatibility/2006">
               <mc:Choice xmlns:v="urn:schemas-microsoft-com:vml" Requires="v">
-                <p:oleObj spid="_x0000_s1037" name="Dokument" r:id="rId6" imgW="6134100" imgH="2438400" progId="Word.Document.12">
+                <p:oleObj spid="_x0000_s1039" name="Dokument" r:id="rId6" imgW="6134100" imgH="2438400" progId="Word.Document.12">
                   <p:embed/>
                 </p:oleObj>
               </mc:Choice>
@@ -8492,7 +8492,7 @@
         <p:spPr>
           <a:xfrm>
             <a:off x="250158" y="1746206"/>
-            <a:ext cx="8695409" cy="4524315"/>
+            <a:ext cx="8695409" cy="3785652"/>
           </a:xfrm>
           <a:prstGeom prst="rect">
             <a:avLst/>
@@ -8549,12 +8549,12 @@
               <a:t>Einfachere Konfigurations-</a:t>
             </a:r>
             <a:r>
-              <a:rPr lang="de-DE" sz="2400" dirty="0" err="1">
+              <a:rPr lang="de-DE" sz="2400" dirty="0" smtClean="0">
                 <a:latin typeface="Helvetica"/>
                 <a:cs typeface="Helvetica"/>
                 <a:sym typeface="Wingdings"/>
               </a:rPr>
-              <a:t>Datein</a:t>
+              <a:t>Dateien</a:t>
             </a:r>
             <a:endParaRPr lang="de-DE" sz="2400" dirty="0">
               <a:latin typeface="Helvetica"/>
@@ -8669,39 +8669,25 @@
                 <a:cs typeface="Helvetica"/>
                 <a:sym typeface="Wingdings"/>
               </a:rPr>
-              <a:t> Modul dazu hat</a:t>
-            </a:r>
-          </a:p>
-          <a:p>
-            <a:pPr marL="342900" indent="-342900">
-              <a:buFont typeface="Arial"/>
-              <a:buChar char="•"/>
-            </a:pPr>
-            <a:r>
-              <a:rPr lang="de-DE" sz="2400" dirty="0">
+              <a:t> Modul </a:t>
+            </a:r>
+            <a:r>
+              <a:rPr lang="de-DE" sz="2400">
                 <a:latin typeface="Helvetica"/>
                 <a:cs typeface="Helvetica"/>
                 <a:sym typeface="Wingdings"/>
               </a:rPr>
-              <a:t>Nicht direkt </a:t>
-            </a:r>
-            <a:r>
-              <a:rPr lang="de-DE" sz="2400" dirty="0" smtClean="0">
+              <a:t>dazu </a:t>
+            </a:r>
+            <a:r>
+              <a:rPr lang="de-DE" sz="2400" smtClean="0">
                 <a:latin typeface="Helvetica"/>
                 <a:cs typeface="Helvetica"/>
                 <a:sym typeface="Wingdings"/>
               </a:rPr>
-              <a:t>notenrelevant</a:t>
-            </a:r>
-            <a:r>
-              <a:rPr lang="de-DE" sz="2400" dirty="0">
-                <a:latin typeface="Helvetica"/>
-                <a:cs typeface="Helvetica"/>
-                <a:sym typeface="Wingdings"/>
-              </a:rPr>
-              <a:t>, Zeit ist besser verwendet das Projekt fertigzustellen</a:t>
-            </a:r>
-            <a:endParaRPr lang="de-DE" sz="2400" dirty="0" smtClean="0">
+              <a:t>hat</a:t>
+            </a:r>
+            <a:endParaRPr lang="de-DE" sz="2400" dirty="0">
               <a:latin typeface="Helvetica"/>
               <a:cs typeface="Helvetica"/>
               <a:sym typeface="Wingdings"/>

</xml_diff>